<commit_message>
Updated Module 12 formatting
</commit_message>
<xml_diff>
--- a/slides/Module 12 - Functions.pptx
+++ b/slides/Module 12 - Functions.pptx
@@ -4484,7 +4484,7 @@
           <a:p>
             <a:r>
               <a:rPr lang="en-US" dirty="0"/>
-              <a:t>JavaScript will not check the type of parameters, meaning that we have to check their type on our own</a:t>
+              <a:t>JavaScript will not check the type of parameters, meaning that we must check their type on our own</a:t>
             </a:r>
           </a:p>
           <a:p>
@@ -5254,6 +5254,42 @@
           </a:p>
         </p:txBody>
       </p:sp>
+      <p:pic>
+        <p:nvPicPr>
+          <p:cNvPr id="5" name="Picture 4" descr="A screenshot of a computer program&#10;&#10;Description automatically generated">
+            <a:extLst>
+              <a:ext uri="{FF2B5EF4-FFF2-40B4-BE49-F238E27FC236}">
+                <a16:creationId xmlns:a16="http://schemas.microsoft.com/office/drawing/2014/main" id="{D871CCAD-B189-3BBC-2BA0-C319511E9E6A}"/>
+              </a:ext>
+            </a:extLst>
+          </p:cNvPr>
+          <p:cNvPicPr>
+            <a:picLocks noChangeAspect="1"/>
+          </p:cNvPicPr>
+          <p:nvPr/>
+        </p:nvPicPr>
+        <p:blipFill>
+          <a:blip r:embed="rId2">
+            <a:extLst>
+              <a:ext uri="{28A0092B-C50C-407E-A947-70E740481C1C}">
+                <a14:useLocalDpi xmlns:a14="http://schemas.microsoft.com/office/drawing/2010/main" val="0"/>
+              </a:ext>
+            </a:extLst>
+          </a:blip>
+          <a:stretch>
+            <a:fillRect/>
+          </a:stretch>
+        </p:blipFill>
+        <p:spPr>
+          <a:xfrm>
+            <a:off x="0" y="4166783"/>
+            <a:ext cx="5181600" cy="2691218"/>
+          </a:xfrm>
+          <a:prstGeom prst="rect">
+            <a:avLst/>
+          </a:prstGeom>
+        </p:spPr>
+      </p:pic>
     </p:spTree>
     <p:extLst>
       <p:ext uri="{BB962C8B-B14F-4D97-AF65-F5344CB8AC3E}">
@@ -6790,7 +6826,7 @@
           <a:p>
             <a:r>
               <a:rPr lang="en-US" dirty="0"/>
-              <a:t>Since Arrays are objects, we are able to apply() the Math object’s max() method on our Array</a:t>
+              <a:t>Since Arrays are objects, we can apply() the Math object’s max() method on our Array</a:t>
             </a:r>
           </a:p>
         </p:txBody>

</xml_diff>